<commit_message>
final presentation & report
</commit_message>
<xml_diff>
--- a/Final Presentation.pptx
+++ b/Final Presentation.pptx
@@ -2985,13 +2985,13 @@
         </p:nvPicPr>
         <p:blipFill rotWithShape="1">
           <a:blip r:embed="rId2"/>
-          <a:srcRect l="35993" t="8547" r="35113" b="33590"/>
+          <a:srcRect l="41193" t="8547" r="41195" b="33590"/>
           <a:stretch/>
         </p:blipFill>
         <p:spPr>
           <a:xfrm>
-            <a:off x="3381130" y="606669"/>
-            <a:ext cx="5284177" cy="5952393"/>
+            <a:off x="4485598" y="452804"/>
+            <a:ext cx="3220805" cy="5952393"/>
           </a:xfrm>
           <a:prstGeom prst="rect">
             <a:avLst/>
@@ -3008,6 +3008,13 @@
   <p:clrMapOvr>
     <a:masterClrMapping/>
   </p:clrMapOvr>
+  <p:timing>
+    <p:tnLst>
+      <p:par>
+        <p:cTn id="1" dur="indefinite" restart="never" nodeType="tmRoot"/>
+      </p:par>
+    </p:tnLst>
+  </p:timing>
 </p:sld>
 </file>
 
@@ -3158,8 +3165,10 @@
       </p:sp>
       <p:pic>
         <p:nvPicPr>
-          <p:cNvPr id="4" name="Picture 3"/>
-          <p:cNvPicPr/>
+          <p:cNvPr id="7" name="Picture 6"/>
+          <p:cNvPicPr>
+            <a:picLocks noChangeAspect="1"/>
+          </p:cNvPicPr>
           <p:nvPr/>
         </p:nvPicPr>
         <p:blipFill>
@@ -3170,8 +3179,8 @@
         </p:blipFill>
         <p:spPr>
           <a:xfrm>
-            <a:off x="2748597" y="585311"/>
-            <a:ext cx="1381125" cy="885190"/>
+            <a:off x="2591018" y="502795"/>
+            <a:ext cx="1161473" cy="1050221"/>
           </a:xfrm>
           <a:prstGeom prst="rect">
             <a:avLst/>
@@ -3180,8 +3189,10 @@
       </p:pic>
       <p:pic>
         <p:nvPicPr>
-          <p:cNvPr id="5" name="Picture 4"/>
-          <p:cNvPicPr/>
+          <p:cNvPr id="8" name="Picture 7"/>
+          <p:cNvPicPr>
+            <a:picLocks noChangeAspect="1"/>
+          </p:cNvPicPr>
           <p:nvPr/>
         </p:nvPicPr>
         <p:blipFill>
@@ -3192,31 +3203,8 @@
         </p:blipFill>
         <p:spPr>
           <a:xfrm>
-            <a:off x="8280717" y="585311"/>
-            <a:ext cx="1381125" cy="885190"/>
-          </a:xfrm>
-          <a:prstGeom prst="rect">
-            <a:avLst/>
-          </a:prstGeom>
-        </p:spPr>
-      </p:pic>
-      <p:pic>
-        <p:nvPicPr>
-          <p:cNvPr id="6" name="Picture 5"/>
-          <p:cNvPicPr>
-            <a:picLocks noChangeAspect="1"/>
-          </p:cNvPicPr>
-          <p:nvPr/>
-        </p:nvPicPr>
-        <p:blipFill rotWithShape="1">
-          <a:blip r:embed="rId3"/>
-          <a:srcRect l="39167" t="11333" r="39166" b="7333"/>
-          <a:stretch/>
-        </p:blipFill>
-        <p:spPr>
-          <a:xfrm>
-            <a:off x="7560260" y="1690687"/>
-            <a:ext cx="2757220" cy="5036844"/>
+            <a:off x="8358133" y="502795"/>
+            <a:ext cx="1161473" cy="1050221"/>
           </a:xfrm>
           <a:prstGeom prst="rect">
             <a:avLst/>
@@ -3233,6 +3221,13 @@
   <p:clrMapOvr>
     <a:masterClrMapping/>
   </p:clrMapOvr>
+  <p:timing>
+    <p:tnLst>
+      <p:par>
+        <p:cTn id="1" dur="indefinite" restart="never" nodeType="tmRoot"/>
+      </p:par>
+    </p:tnLst>
+  </p:timing>
 </p:sld>
 </file>
 

</xml_diff>

<commit_message>
update van profielpagina in ppt en report
</commit_message>
<xml_diff>
--- a/Final Presentation.pptx
+++ b/Final Presentation.pptx
@@ -249,7 +249,7 @@
           <a:p>
             <a:fld id="{DBCB7B46-9E2E-48EA-A2A9-A10B40684EC7}" type="datetimeFigureOut">
               <a:rPr lang="en-GB" smtClean="0"/>
-              <a:t>14/01/2016</a:t>
+              <a:t>18/01/2016</a:t>
             </a:fld>
             <a:endParaRPr lang="en-GB"/>
           </a:p>
@@ -419,7 +419,7 @@
           <a:p>
             <a:fld id="{DBCB7B46-9E2E-48EA-A2A9-A10B40684EC7}" type="datetimeFigureOut">
               <a:rPr lang="en-GB" smtClean="0"/>
-              <a:t>14/01/2016</a:t>
+              <a:t>18/01/2016</a:t>
             </a:fld>
             <a:endParaRPr lang="en-GB"/>
           </a:p>
@@ -599,7 +599,7 @@
           <a:p>
             <a:fld id="{DBCB7B46-9E2E-48EA-A2A9-A10B40684EC7}" type="datetimeFigureOut">
               <a:rPr lang="en-GB" smtClean="0"/>
-              <a:t>14/01/2016</a:t>
+              <a:t>18/01/2016</a:t>
             </a:fld>
             <a:endParaRPr lang="en-GB"/>
           </a:p>
@@ -769,7 +769,7 @@
           <a:p>
             <a:fld id="{DBCB7B46-9E2E-48EA-A2A9-A10B40684EC7}" type="datetimeFigureOut">
               <a:rPr lang="en-GB" smtClean="0"/>
-              <a:t>14/01/2016</a:t>
+              <a:t>18/01/2016</a:t>
             </a:fld>
             <a:endParaRPr lang="en-GB"/>
           </a:p>
@@ -1015,7 +1015,7 @@
           <a:p>
             <a:fld id="{DBCB7B46-9E2E-48EA-A2A9-A10B40684EC7}" type="datetimeFigureOut">
               <a:rPr lang="en-GB" smtClean="0"/>
-              <a:t>14/01/2016</a:t>
+              <a:t>18/01/2016</a:t>
             </a:fld>
             <a:endParaRPr lang="en-GB"/>
           </a:p>
@@ -1247,7 +1247,7 @@
           <a:p>
             <a:fld id="{DBCB7B46-9E2E-48EA-A2A9-A10B40684EC7}" type="datetimeFigureOut">
               <a:rPr lang="en-GB" smtClean="0"/>
-              <a:t>14/01/2016</a:t>
+              <a:t>18/01/2016</a:t>
             </a:fld>
             <a:endParaRPr lang="en-GB"/>
           </a:p>
@@ -1614,7 +1614,7 @@
           <a:p>
             <a:fld id="{DBCB7B46-9E2E-48EA-A2A9-A10B40684EC7}" type="datetimeFigureOut">
               <a:rPr lang="en-GB" smtClean="0"/>
-              <a:t>14/01/2016</a:t>
+              <a:t>18/01/2016</a:t>
             </a:fld>
             <a:endParaRPr lang="en-GB"/>
           </a:p>
@@ -1732,7 +1732,7 @@
           <a:p>
             <a:fld id="{DBCB7B46-9E2E-48EA-A2A9-A10B40684EC7}" type="datetimeFigureOut">
               <a:rPr lang="en-GB" smtClean="0"/>
-              <a:t>14/01/2016</a:t>
+              <a:t>18/01/2016</a:t>
             </a:fld>
             <a:endParaRPr lang="en-GB"/>
           </a:p>
@@ -1827,7 +1827,7 @@
           <a:p>
             <a:fld id="{DBCB7B46-9E2E-48EA-A2A9-A10B40684EC7}" type="datetimeFigureOut">
               <a:rPr lang="en-GB" smtClean="0"/>
-              <a:t>14/01/2016</a:t>
+              <a:t>18/01/2016</a:t>
             </a:fld>
             <a:endParaRPr lang="en-GB"/>
           </a:p>
@@ -2104,7 +2104,7 @@
           <a:p>
             <a:fld id="{DBCB7B46-9E2E-48EA-A2A9-A10B40684EC7}" type="datetimeFigureOut">
               <a:rPr lang="en-GB" smtClean="0"/>
-              <a:t>14/01/2016</a:t>
+              <a:t>18/01/2016</a:t>
             </a:fld>
             <a:endParaRPr lang="en-GB"/>
           </a:p>
@@ -2357,7 +2357,7 @@
           <a:p>
             <a:fld id="{DBCB7B46-9E2E-48EA-A2A9-A10B40684EC7}" type="datetimeFigureOut">
               <a:rPr lang="en-GB" smtClean="0"/>
-              <a:t>14/01/2016</a:t>
+              <a:t>18/01/2016</a:t>
             </a:fld>
             <a:endParaRPr lang="en-GB"/>
           </a:p>
@@ -2570,7 +2570,7 @@
           <a:p>
             <a:fld id="{DBCB7B46-9E2E-48EA-A2A9-A10B40684EC7}" type="datetimeFigureOut">
               <a:rPr lang="en-GB" smtClean="0"/>
-              <a:t>14/01/2016</a:t>
+              <a:t>18/01/2016</a:t>
             </a:fld>
             <a:endParaRPr lang="en-GB"/>
           </a:p>
@@ -3544,31 +3544,25 @@
       </p:sp>
       <p:pic>
         <p:nvPicPr>
-          <p:cNvPr id="4" name="Picture 3"/>
-          <p:cNvPicPr/>
+          <p:cNvPr id="5" name="Picture 4"/>
+          <p:cNvPicPr>
+            <a:picLocks noChangeAspect="1"/>
+          </p:cNvPicPr>
           <p:nvPr/>
         </p:nvPicPr>
         <p:blipFill rotWithShape="1">
           <a:blip r:embed="rId2"/>
-          <a:srcRect t="7386" b="5160"/>
+          <a:srcRect t="2816" r="1166" b="4565"/>
           <a:stretch/>
         </p:blipFill>
-        <p:spPr bwMode="auto">
+        <p:spPr>
           <a:xfrm>
-            <a:off x="2323782" y="3221197"/>
-            <a:ext cx="7544435" cy="3336766"/>
+            <a:off x="2341076" y="3148642"/>
+            <a:ext cx="6578637" cy="3467818"/>
           </a:xfrm>
           <a:prstGeom prst="rect">
             <a:avLst/>
           </a:prstGeom>
-          <a:ln>
-            <a:noFill/>
-          </a:ln>
-          <a:extLst>
-            <a:ext uri="{53640926-AAD7-44D8-BBD7-CCE9431645EC}">
-              <a14:shadowObscured xmlns:a14="http://schemas.microsoft.com/office/drawing/2010/main"/>
-            </a:ext>
-          </a:extLst>
         </p:spPr>
       </p:pic>
     </p:spTree>

</xml_diff>